<commit_message>
Update to Cordova Deck
</commit_message>
<xml_diff>
--- a/O3654-1 Deep dive into Mobile Development with Office 365 and Cordova/O3654-1 Deep dive into Mobile Development with Office 365 and Cordova.pptx
+++ b/O3654-1 Deep dive into Mobile Development with Office 365 and Cordova/O3654-1 Deep dive into Mobile Development with Office 365 and Cordova.pptx
@@ -6,10 +6,10 @@
     <p:sldMasterId id="2147484046" r:id="rId5"/>
   </p:sldMasterIdLst>
   <p:notesMasterIdLst>
-    <p:notesMasterId r:id="rId41"/>
+    <p:notesMasterId r:id="rId40"/>
   </p:notesMasterIdLst>
   <p:handoutMasterIdLst>
-    <p:handoutMasterId r:id="rId42"/>
+    <p:handoutMasterId r:id="rId41"/>
   </p:handoutMasterIdLst>
   <p:sldIdLst>
     <p:sldId id="778" r:id="rId6"/>
@@ -19,34 +19,33 @@
     <p:sldId id="783" r:id="rId10"/>
     <p:sldId id="913" r:id="rId11"/>
     <p:sldId id="914" r:id="rId12"/>
-    <p:sldId id="909" r:id="rId13"/>
-    <p:sldId id="910" r:id="rId14"/>
-    <p:sldId id="911" r:id="rId15"/>
-    <p:sldId id="901" r:id="rId16"/>
-    <p:sldId id="915" r:id="rId17"/>
-    <p:sldId id="903" r:id="rId18"/>
-    <p:sldId id="904" r:id="rId19"/>
-    <p:sldId id="916" r:id="rId20"/>
-    <p:sldId id="912" r:id="rId21"/>
-    <p:sldId id="905" r:id="rId22"/>
-    <p:sldId id="917" r:id="rId23"/>
-    <p:sldId id="918" r:id="rId24"/>
-    <p:sldId id="919" r:id="rId25"/>
-    <p:sldId id="924" r:id="rId26"/>
-    <p:sldId id="925" r:id="rId27"/>
-    <p:sldId id="907" r:id="rId28"/>
-    <p:sldId id="908" r:id="rId29"/>
-    <p:sldId id="885" r:id="rId30"/>
-    <p:sldId id="886" r:id="rId31"/>
-    <p:sldId id="921" r:id="rId32"/>
-    <p:sldId id="922" r:id="rId33"/>
-    <p:sldId id="923" r:id="rId34"/>
-    <p:sldId id="920" r:id="rId35"/>
-    <p:sldId id="926" r:id="rId36"/>
-    <p:sldId id="927" r:id="rId37"/>
-    <p:sldId id="868" r:id="rId38"/>
-    <p:sldId id="853" r:id="rId39"/>
-    <p:sldId id="654" r:id="rId40"/>
+    <p:sldId id="928" r:id="rId13"/>
+    <p:sldId id="911" r:id="rId14"/>
+    <p:sldId id="901" r:id="rId15"/>
+    <p:sldId id="915" r:id="rId16"/>
+    <p:sldId id="903" r:id="rId17"/>
+    <p:sldId id="904" r:id="rId18"/>
+    <p:sldId id="916" r:id="rId19"/>
+    <p:sldId id="912" r:id="rId20"/>
+    <p:sldId id="905" r:id="rId21"/>
+    <p:sldId id="917" r:id="rId22"/>
+    <p:sldId id="918" r:id="rId23"/>
+    <p:sldId id="919" r:id="rId24"/>
+    <p:sldId id="924" r:id="rId25"/>
+    <p:sldId id="925" r:id="rId26"/>
+    <p:sldId id="907" r:id="rId27"/>
+    <p:sldId id="908" r:id="rId28"/>
+    <p:sldId id="885" r:id="rId29"/>
+    <p:sldId id="886" r:id="rId30"/>
+    <p:sldId id="921" r:id="rId31"/>
+    <p:sldId id="922" r:id="rId32"/>
+    <p:sldId id="923" r:id="rId33"/>
+    <p:sldId id="920" r:id="rId34"/>
+    <p:sldId id="926" r:id="rId35"/>
+    <p:sldId id="927" r:id="rId36"/>
+    <p:sldId id="868" r:id="rId37"/>
+    <p:sldId id="853" r:id="rId38"/>
+    <p:sldId id="654" r:id="rId39"/>
   </p:sldIdLst>
   <p:sldSz cx="12188825" cy="6858000"/>
   <p:notesSz cx="6858000" cy="9144000"/>
@@ -349,7 +348,7 @@
           <a:p>
             <a:fld id="{DE219B1A-AE41-483B-A766-69B9363DDA6A}" type="datetimeFigureOut">
               <a:rPr lang="en-US" smtClean="0"/>
-              <a:t>9/30/2014</a:t>
+              <a:t>10/3/2014</a:t>
             </a:fld>
             <a:endParaRPr lang="en-US"/>
           </a:p>
@@ -631,7 +630,7 @@
           <a:p>
             <a:fld id="{D51B1278-D92B-4AF3-A9C1-71DD298190CE}" type="datetimeFigureOut">
               <a:rPr lang="en-US" smtClean="0"/>
-              <a:t>9/30/2014</a:t>
+              <a:t>10/3/2014</a:t>
             </a:fld>
             <a:endParaRPr lang="en-US"/>
           </a:p>
@@ -1266,7 +1265,7 @@
           <a:p>
             <a:fld id="{B079C3B8-7366-4A44-A34B-3977080C19E7}" type="datetime1">
               <a:rPr lang="en-US" smtClean="0"/>
-              <a:t>9/30/2014</a:t>
+              <a:t>10/3/2014</a:t>
             </a:fld>
             <a:endParaRPr lang="en-US" dirty="0"/>
           </a:p>
@@ -1397,7 +1396,7 @@
           <a:p>
             <a:fld id="{70170D7A-9E18-46B1-96D4-727DBF3F3357}" type="datetime1">
               <a:rPr lang="en-US" smtClean="0"/>
-              <a:t>9/30/2014</a:t>
+              <a:t>10/3/2014</a:t>
             </a:fld>
             <a:endParaRPr lang="en-US"/>
           </a:p>
@@ -1420,7 +1419,7 @@
           <a:p>
             <a:fld id="{B4008EB6-D09E-4580-8CD6-DDB14511944F}" type="slidenum">
               <a:rPr lang="en-US" smtClean="0"/>
-              <a:t>33</a:t>
+              <a:t>32</a:t>
             </a:fld>
             <a:endParaRPr lang="en-US" dirty="0"/>
           </a:p>
@@ -1657,7 +1656,7 @@
           <a:p>
             <a:fld id="{B079C3B8-7366-4A44-A34B-3977080C19E7}" type="datetime1">
               <a:rPr lang="en-US" smtClean="0"/>
-              <a:t>9/30/2014</a:t>
+              <a:t>10/3/2014</a:t>
             </a:fld>
             <a:endParaRPr lang="en-US" dirty="0"/>
           </a:p>
@@ -1681,7 +1680,7 @@
             <a:fld id="{B4008EB6-D09E-4580-8CD6-DDB14511944F}" type="slidenum">
               <a:rPr lang="en-US" smtClean="0"/>
               <a:pPr/>
-              <a:t>34</a:t>
+              <a:t>33</a:t>
             </a:fld>
             <a:endParaRPr lang="en-US" dirty="0"/>
           </a:p>
@@ -1899,7 +1898,7 @@
           <a:p>
             <a:fld id="{0BB6559B-C68D-49B4-97AE-9BB74C417927}" type="datetime1">
               <a:rPr lang="en-US" smtClean="0"/>
-              <a:t>9/30/2014</a:t>
+              <a:t>10/3/2014</a:t>
             </a:fld>
             <a:endParaRPr lang="en-US"/>
           </a:p>
@@ -1922,7 +1921,7 @@
           <a:p>
             <a:fld id="{B4008EB6-D09E-4580-8CD6-DDB14511944F}" type="slidenum">
               <a:rPr lang="en-US" smtClean="0"/>
-              <a:t>35</a:t>
+              <a:t>34</a:t>
             </a:fld>
             <a:endParaRPr lang="en-US" dirty="0"/>
           </a:p>
@@ -11804,180 +11803,6 @@
           <a:chExt cx="0" cy="0"/>
         </a:xfrm>
       </p:grpSpPr>
-      <p:sp>
-        <p:nvSpPr>
-          <p:cNvPr id="2" name="Title 1"/>
-          <p:cNvSpPr>
-            <a:spLocks noGrp="1"/>
-          </p:cNvSpPr>
-          <p:nvPr>
-            <p:ph type="title"/>
-          </p:nvPr>
-        </p:nvSpPr>
-        <p:spPr/>
-        <p:txBody>
-          <a:bodyPr/>
-          <a:lstStyle/>
-          <a:p>
-            <a:r>
-              <a:rPr lang="en-US" dirty="0" smtClean="0"/>
-              <a:t>Setting Up Your Developer Environment</a:t>
-            </a:r>
-            <a:endParaRPr lang="en-US" dirty="0"/>
-          </a:p>
-        </p:txBody>
-      </p:sp>
-      <p:sp>
-        <p:nvSpPr>
-          <p:cNvPr id="3" name="Text Placeholder 2"/>
-          <p:cNvSpPr>
-            <a:spLocks noGrp="1"/>
-          </p:cNvSpPr>
-          <p:nvPr>
-            <p:ph type="body" sz="quarter" idx="10"/>
-          </p:nvPr>
-        </p:nvSpPr>
-        <p:spPr/>
-        <p:txBody>
-          <a:bodyPr/>
-          <a:lstStyle/>
-          <a:p>
-            <a:r>
-              <a:rPr lang="en-US" dirty="0" smtClean="0"/>
-              <a:t>Installation Documentation</a:t>
-            </a:r>
-          </a:p>
-          <a:p>
-            <a:pPr lvl="1"/>
-            <a:r>
-              <a:rPr lang="en-US" dirty="0" smtClean="0">
-                <a:hlinkClick r:id="rId2"/>
-              </a:rPr>
-              <a:t>http://msdn.microsoft.com/en-us/library/dn757054.aspx</a:t>
-            </a:r>
-            <a:endParaRPr lang="en-US" dirty="0" smtClean="0"/>
-          </a:p>
-          <a:p>
-            <a:endParaRPr lang="en-US" dirty="0" smtClean="0"/>
-          </a:p>
-          <a:p>
-            <a:r>
-              <a:rPr lang="en-US" dirty="0" smtClean="0"/>
-              <a:t>Setup Overview</a:t>
-            </a:r>
-          </a:p>
-          <a:p>
-            <a:pPr lvl="1"/>
-            <a:r>
-              <a:rPr lang="en-US" dirty="0" smtClean="0"/>
-              <a:t>Windows 8.1 or Windows Server 2012 R2</a:t>
-            </a:r>
-          </a:p>
-          <a:p>
-            <a:pPr lvl="1"/>
-            <a:r>
-              <a:rPr lang="en-US" dirty="0" smtClean="0"/>
-              <a:t>Visual Studio 2013 with Update 3 with Windows Phone SDK</a:t>
-            </a:r>
-          </a:p>
-          <a:p>
-            <a:pPr lvl="1"/>
-            <a:r>
-              <a:rPr lang="en-US" dirty="0"/>
-              <a:t>Multi-Device Hybrid Apps for Visual </a:t>
-            </a:r>
-            <a:r>
-              <a:rPr lang="en-US" dirty="0" smtClean="0"/>
-              <a:t>Studio CTP 2.0</a:t>
-            </a:r>
-          </a:p>
-          <a:p>
-            <a:pPr lvl="1"/>
-            <a:endParaRPr lang="en-US" dirty="0"/>
-          </a:p>
-        </p:txBody>
-      </p:sp>
-      <p:sp>
-        <p:nvSpPr>
-          <p:cNvPr id="4" name="Slide Number Placeholder 3"/>
-          <p:cNvSpPr>
-            <a:spLocks noGrp="1"/>
-          </p:cNvSpPr>
-          <p:nvPr>
-            <p:ph type="sldNum" sz="quarter" idx="12"/>
-          </p:nvPr>
-        </p:nvSpPr>
-        <p:spPr/>
-        <p:txBody>
-          <a:bodyPr/>
-          <a:lstStyle/>
-          <a:p>
-            <a:fld id="{727B4C2D-45E2-4621-8491-2995EB46A674}" type="slidenum">
-              <a:rPr lang="en-US" smtClean="0"/>
-              <a:pPr/>
-              <a:t>10</a:t>
-            </a:fld>
-            <a:endParaRPr lang="en-US" dirty="0"/>
-          </a:p>
-        </p:txBody>
-      </p:sp>
-      <p:pic>
-        <p:nvPicPr>
-          <p:cNvPr id="5" name="Picture 4"/>
-          <p:cNvPicPr>
-            <a:picLocks noChangeAspect="1"/>
-          </p:cNvPicPr>
-          <p:nvPr/>
-        </p:nvPicPr>
-        <p:blipFill>
-          <a:blip r:embed="rId3"/>
-          <a:stretch>
-            <a:fillRect/>
-          </a:stretch>
-        </p:blipFill>
-        <p:spPr>
-          <a:xfrm>
-            <a:off x="9262497" y="1447799"/>
-            <a:ext cx="2483530" cy="3184635"/>
-          </a:xfrm>
-          <a:prstGeom prst="rect">
-            <a:avLst/>
-          </a:prstGeom>
-        </p:spPr>
-      </p:pic>
-    </p:spTree>
-    <p:extLst>
-      <p:ext uri="{BB962C8B-B14F-4D97-AF65-F5344CB8AC3E}">
-        <p14:creationId xmlns:p14="http://schemas.microsoft.com/office/powerpoint/2010/main" val="1181949905"/>
-      </p:ext>
-    </p:extLst>
-  </p:cSld>
-  <p:clrMapOvr>
-    <a:masterClrMapping/>
-  </p:clrMapOvr>
-  <p:transition>
-    <p:fade/>
-  </p:transition>
-</p:sld>
-</file>
-
-<file path=ppt/slides/slide11.xml><?xml version="1.0" encoding="utf-8"?>
-<p:sld xmlns:a="http://schemas.openxmlformats.org/drawingml/2006/main" xmlns:r="http://schemas.openxmlformats.org/officeDocument/2006/relationships" xmlns:p="http://schemas.openxmlformats.org/presentationml/2006/main">
-  <p:cSld>
-    <p:spTree>
-      <p:nvGrpSpPr>
-        <p:cNvPr id="1" name=""/>
-        <p:cNvGrpSpPr/>
-        <p:nvPr/>
-      </p:nvGrpSpPr>
-      <p:grpSpPr>
-        <a:xfrm>
-          <a:off x="0" y="0"/>
-          <a:ext cx="0" cy="0"/>
-          <a:chOff x="0" y="0"/>
-          <a:chExt cx="0" cy="0"/>
-        </a:xfrm>
-      </p:grpSpPr>
       <p:grpSp>
         <p:nvGrpSpPr>
           <p:cNvPr id="5" name="Group 4"/>
@@ -12094,7 +11919,7 @@
 </p:sld>
 </file>
 
-<file path=ppt/slides/slide12.xml><?xml version="1.0" encoding="utf-8"?>
+<file path=ppt/slides/slide11.xml><?xml version="1.0" encoding="utf-8"?>
 <p:sld xmlns:a="http://schemas.openxmlformats.org/drawingml/2006/main" xmlns:r="http://schemas.openxmlformats.org/officeDocument/2006/relationships" xmlns:p="http://schemas.openxmlformats.org/presentationml/2006/main">
   <p:cSld>
     <p:spTree>
@@ -12149,7 +11974,7 @@
 </p:sld>
 </file>
 
-<file path=ppt/slides/slide13.xml><?xml version="1.0" encoding="utf-8"?>
+<file path=ppt/slides/slide12.xml><?xml version="1.0" encoding="utf-8"?>
 <p:sld xmlns:a="http://schemas.openxmlformats.org/drawingml/2006/main" xmlns:r="http://schemas.openxmlformats.org/officeDocument/2006/relationships" xmlns:p="http://schemas.openxmlformats.org/presentationml/2006/main">
   <p:cSld>
     <p:spTree>
@@ -12259,7 +12084,7 @@
 </p:sld>
 </file>
 
-<file path=ppt/slides/slide14.xml><?xml version="1.0" encoding="utf-8"?>
+<file path=ppt/slides/slide13.xml><?xml version="1.0" encoding="utf-8"?>
 <p:sld xmlns:a="http://schemas.openxmlformats.org/drawingml/2006/main" xmlns:r="http://schemas.openxmlformats.org/officeDocument/2006/relationships" xmlns:p="http://schemas.openxmlformats.org/presentationml/2006/main">
   <p:cSld>
     <p:spTree>
@@ -12484,7 +12309,7 @@
 </p:sld>
 </file>
 
-<file path=ppt/slides/slide15.xml><?xml version="1.0" encoding="utf-8"?>
+<file path=ppt/slides/slide14.xml><?xml version="1.0" encoding="utf-8"?>
 <p:sld xmlns:a="http://schemas.openxmlformats.org/drawingml/2006/main" xmlns:r="http://schemas.openxmlformats.org/officeDocument/2006/relationships" xmlns:p="http://schemas.openxmlformats.org/presentationml/2006/main">
   <p:cSld>
     <p:spTree>
@@ -12579,7 +12404,6 @@
               <a:rPr lang="en-US" dirty="0" smtClean="0"/>
               <a:t>Other Windows Devices</a:t>
             </a:r>
-            <a:endParaRPr lang="en-US" dirty="0" smtClean="0"/>
           </a:p>
         </p:txBody>
       </p:sp>
@@ -12601,7 +12425,7 @@
             <a:fld id="{727B4C2D-45E2-4621-8491-2995EB46A674}" type="slidenum">
               <a:rPr lang="en-US" smtClean="0"/>
               <a:pPr/>
-              <a:t>15</a:t>
+              <a:t>14</a:t>
             </a:fld>
             <a:endParaRPr lang="en-US" dirty="0"/>
           </a:p>
@@ -12623,7 +12447,7 @@
 </p:sld>
 </file>
 
-<file path=ppt/slides/slide16.xml><?xml version="1.0" encoding="utf-8"?>
+<file path=ppt/slides/slide15.xml><?xml version="1.0" encoding="utf-8"?>
 <p:sld xmlns:a="http://schemas.openxmlformats.org/drawingml/2006/main" xmlns:r="http://schemas.openxmlformats.org/officeDocument/2006/relationships" xmlns:p="http://schemas.openxmlformats.org/presentationml/2006/main">
   <p:cSld>
     <p:spTree>
@@ -12764,7 +12588,7 @@
             <a:fld id="{727B4C2D-45E2-4621-8491-2995EB46A674}" type="slidenum">
               <a:rPr lang="en-US" smtClean="0"/>
               <a:pPr/>
-              <a:t>16</a:t>
+              <a:t>15</a:t>
             </a:fld>
             <a:endParaRPr lang="en-US" dirty="0"/>
           </a:p>
@@ -12786,7 +12610,7 @@
 </p:sld>
 </file>
 
-<file path=ppt/slides/slide17.xml><?xml version="1.0" encoding="utf-8"?>
+<file path=ppt/slides/slide16.xml><?xml version="1.0" encoding="utf-8"?>
 <p:sld xmlns:a="http://schemas.openxmlformats.org/drawingml/2006/main" xmlns:r="http://schemas.openxmlformats.org/officeDocument/2006/relationships" xmlns:p="http://schemas.openxmlformats.org/presentationml/2006/main">
   <p:cSld>
     <p:spTree>
@@ -12895,7 +12719,7 @@
 </p:sld>
 </file>
 
-<file path=ppt/slides/slide18.xml><?xml version="1.0" encoding="utf-8"?>
+<file path=ppt/slides/slide17.xml><?xml version="1.0" encoding="utf-8"?>
 <p:sld xmlns:a="http://schemas.openxmlformats.org/drawingml/2006/main" xmlns:r="http://schemas.openxmlformats.org/officeDocument/2006/relationships" xmlns:p="http://schemas.openxmlformats.org/presentationml/2006/main">
   <p:cSld>
     <p:spTree>
@@ -12982,7 +12806,7 @@
             <a:fld id="{727B4C2D-45E2-4621-8491-2995EB46A674}" type="slidenum">
               <a:rPr lang="en-US" smtClean="0"/>
               <a:pPr/>
-              <a:t>18</a:t>
+              <a:t>17</a:t>
             </a:fld>
             <a:endParaRPr lang="en-US" dirty="0"/>
           </a:p>
@@ -13028,6 +12852,81 @@
 </p:sld>
 </file>
 
+<file path=ppt/slides/slide18.xml><?xml version="1.0" encoding="utf-8"?>
+<p:sld xmlns:a="http://schemas.openxmlformats.org/drawingml/2006/main" xmlns:r="http://schemas.openxmlformats.org/officeDocument/2006/relationships" xmlns:p="http://schemas.openxmlformats.org/presentationml/2006/main">
+  <p:cSld>
+    <p:spTree>
+      <p:nvGrpSpPr>
+        <p:cNvPr id="1" name=""/>
+        <p:cNvGrpSpPr/>
+        <p:nvPr/>
+      </p:nvGrpSpPr>
+      <p:grpSpPr>
+        <a:xfrm>
+          <a:off x="0" y="0"/>
+          <a:ext cx="0" cy="0"/>
+          <a:chOff x="0" y="0"/>
+          <a:chExt cx="0" cy="0"/>
+        </a:xfrm>
+      </p:grpSpPr>
+      <p:sp>
+        <p:nvSpPr>
+          <p:cNvPr id="2" name="Subtitle 1"/>
+          <p:cNvSpPr>
+            <a:spLocks noGrp="1"/>
+          </p:cNvSpPr>
+          <p:nvPr>
+            <p:ph type="subTitle" idx="1"/>
+          </p:nvPr>
+        </p:nvSpPr>
+        <p:spPr/>
+        <p:txBody>
+          <a:bodyPr/>
+          <a:lstStyle/>
+          <a:p>
+            <a:r>
+              <a:rPr lang="en-US" dirty="0" smtClean="0"/>
+              <a:t>Creating and Running a Cordova App Project</a:t>
+            </a:r>
+            <a:endParaRPr lang="en-US" dirty="0"/>
+          </a:p>
+        </p:txBody>
+      </p:sp>
+      <p:sp>
+        <p:nvSpPr>
+          <p:cNvPr id="3" name="Text Placeholder 2"/>
+          <p:cNvSpPr>
+            <a:spLocks noGrp="1"/>
+          </p:cNvSpPr>
+          <p:nvPr>
+            <p:ph type="body" sz="quarter" idx="10"/>
+          </p:nvPr>
+        </p:nvSpPr>
+        <p:spPr/>
+        <p:txBody>
+          <a:bodyPr/>
+          <a:lstStyle/>
+          <a:p>
+            <a:endParaRPr lang="en-US"/>
+          </a:p>
+        </p:txBody>
+      </p:sp>
+    </p:spTree>
+    <p:extLst>
+      <p:ext uri="{BB962C8B-B14F-4D97-AF65-F5344CB8AC3E}">
+        <p14:creationId xmlns:p14="http://schemas.microsoft.com/office/powerpoint/2010/main" val="1500579852"/>
+      </p:ext>
+    </p:extLst>
+  </p:cSld>
+  <p:clrMapOvr>
+    <a:masterClrMapping/>
+  </p:clrMapOvr>
+  <p:transition>
+    <p:fade/>
+  </p:transition>
+</p:sld>
+</file>
+
 <file path=ppt/slides/slide19.xml><?xml version="1.0" encoding="utf-8"?>
 <p:sld xmlns:a="http://schemas.openxmlformats.org/drawingml/2006/main" xmlns:r="http://schemas.openxmlformats.org/officeDocument/2006/relationships" xmlns:p="http://schemas.openxmlformats.org/presentationml/2006/main">
   <p:cSld>
@@ -13047,12 +12946,12 @@
       </p:grpSpPr>
       <p:sp>
         <p:nvSpPr>
-          <p:cNvPr id="2" name="Subtitle 1"/>
+          <p:cNvPr id="2" name="Title 1"/>
           <p:cNvSpPr>
             <a:spLocks noGrp="1"/>
           </p:cNvSpPr>
           <p:nvPr>
-            <p:ph type="subTitle" idx="1"/>
+            <p:ph type="title"/>
           </p:nvPr>
         </p:nvSpPr>
         <p:spPr/>
@@ -13061,36 +12960,21 @@
           <a:lstStyle/>
           <a:p>
             <a:r>
-              <a:rPr lang="en-US" dirty="0" smtClean="0"/>
-              <a:t>Creating and Running a Cordova App Project</a:t>
-            </a:r>
-            <a:endParaRPr lang="en-US" dirty="0"/>
-          </a:p>
-        </p:txBody>
-      </p:sp>
-      <p:sp>
-        <p:nvSpPr>
-          <p:cNvPr id="3" name="Text Placeholder 2"/>
-          <p:cNvSpPr>
-            <a:spLocks noGrp="1"/>
-          </p:cNvSpPr>
-          <p:nvPr>
-            <p:ph type="body" sz="quarter" idx="10"/>
-          </p:nvPr>
-        </p:nvSpPr>
-        <p:spPr/>
-        <p:txBody>
-          <a:bodyPr/>
-          <a:lstStyle/>
-          <a:p>
-            <a:endParaRPr lang="en-US"/>
+              <a:rPr lang="en-US" sz="7200" dirty="0"/>
+              <a:t>Cordova Apps and Office </a:t>
+            </a:r>
+            <a:r>
+              <a:rPr lang="en-US" sz="7200" dirty="0" smtClean="0"/>
+              <a:t>365</a:t>
+            </a:r>
+            <a:endParaRPr lang="en-US" sz="7200" dirty="0"/>
           </a:p>
         </p:txBody>
       </p:sp>
     </p:spTree>
     <p:extLst>
       <p:ext uri="{BB962C8B-B14F-4D97-AF65-F5344CB8AC3E}">
-        <p14:creationId xmlns:p14="http://schemas.microsoft.com/office/powerpoint/2010/main" val="1500579852"/>
+        <p14:creationId xmlns:p14="http://schemas.microsoft.com/office/powerpoint/2010/main" val="1757357725"/>
       </p:ext>
     </p:extLst>
   </p:cSld>
@@ -13172,7 +13056,7 @@
                 <a:gridCol w="11225057">
                   <a:extLst>
                     <a:ext uri="{9D8B030D-6E8A-4147-A177-3AD203B41FA5}">
-                      <a16:colId xmlns="" xmlns:a16="http://schemas.microsoft.com/office/drawing/2014/main" val="1253488153"/>
+                      <a16:colId xmlns:a16="http://schemas.microsoft.com/office/drawing/2014/main" xmlns="" val="1253488153"/>
                     </a:ext>
                   </a:extLst>
                 </a:gridCol>
@@ -13194,7 +13078,7 @@
                 </a:tc>
                 <a:extLst>
                   <a:ext uri="{0D108BD9-81ED-4DB2-BD59-A6C34878D82A}">
-                    <a16:rowId xmlns="" xmlns:a16="http://schemas.microsoft.com/office/drawing/2014/main" val="829859176"/>
+                    <a16:rowId xmlns:a16="http://schemas.microsoft.com/office/drawing/2014/main" xmlns="" val="829859176"/>
                   </a:ext>
                 </a:extLst>
               </a:tr>
@@ -13219,7 +13103,7 @@
                 </a:tc>
                 <a:extLst>
                   <a:ext uri="{0D108BD9-81ED-4DB2-BD59-A6C34878D82A}">
-                    <a16:rowId xmlns="" xmlns:a16="http://schemas.microsoft.com/office/drawing/2014/main" val="1946132611"/>
+                    <a16:rowId xmlns:a16="http://schemas.microsoft.com/office/drawing/2014/main" xmlns="" val="1946132611"/>
                   </a:ext>
                 </a:extLst>
               </a:tr>
@@ -13273,7 +13157,7 @@
                 </a:tc>
                 <a:extLst>
                   <a:ext uri="{0D108BD9-81ED-4DB2-BD59-A6C34878D82A}">
-                    <a16:rowId xmlns="" xmlns:a16="http://schemas.microsoft.com/office/drawing/2014/main" val="3204002662"/>
+                    <a16:rowId xmlns:a16="http://schemas.microsoft.com/office/drawing/2014/main" xmlns="" val="3204002662"/>
                   </a:ext>
                 </a:extLst>
               </a:tr>
@@ -13351,7 +13235,7 @@
                 </a:tc>
                 <a:extLst>
                   <a:ext uri="{0D108BD9-81ED-4DB2-BD59-A6C34878D82A}">
-                    <a16:rowId xmlns="" xmlns:a16="http://schemas.microsoft.com/office/drawing/2014/main" val="4266278162"/>
+                    <a16:rowId xmlns:a16="http://schemas.microsoft.com/office/drawing/2014/main" xmlns="" val="4266278162"/>
                   </a:ext>
                 </a:extLst>
               </a:tr>
@@ -13531,66 +13415,6 @@
           <a:lstStyle/>
           <a:p>
             <a:r>
-              <a:rPr lang="en-US" sz="7200" dirty="0"/>
-              <a:t>Cordova Apps and Office </a:t>
-            </a:r>
-            <a:r>
-              <a:rPr lang="en-US" sz="7200" dirty="0" smtClean="0"/>
-              <a:t>365</a:t>
-            </a:r>
-            <a:endParaRPr lang="en-US" sz="7200" dirty="0"/>
-          </a:p>
-        </p:txBody>
-      </p:sp>
-    </p:spTree>
-    <p:extLst>
-      <p:ext uri="{BB962C8B-B14F-4D97-AF65-F5344CB8AC3E}">
-        <p14:creationId xmlns:p14="http://schemas.microsoft.com/office/powerpoint/2010/main" val="1757357725"/>
-      </p:ext>
-    </p:extLst>
-  </p:cSld>
-  <p:clrMapOvr>
-    <a:masterClrMapping/>
-  </p:clrMapOvr>
-  <p:transition>
-    <p:fade/>
-  </p:transition>
-</p:sld>
-</file>
-
-<file path=ppt/slides/slide21.xml><?xml version="1.0" encoding="utf-8"?>
-<p:sld xmlns:a="http://schemas.openxmlformats.org/drawingml/2006/main" xmlns:r="http://schemas.openxmlformats.org/officeDocument/2006/relationships" xmlns:p="http://schemas.openxmlformats.org/presentationml/2006/main">
-  <p:cSld>
-    <p:spTree>
-      <p:nvGrpSpPr>
-        <p:cNvPr id="1" name=""/>
-        <p:cNvGrpSpPr/>
-        <p:nvPr/>
-      </p:nvGrpSpPr>
-      <p:grpSpPr>
-        <a:xfrm>
-          <a:off x="0" y="0"/>
-          <a:ext cx="0" cy="0"/>
-          <a:chOff x="0" y="0"/>
-          <a:chExt cx="0" cy="0"/>
-        </a:xfrm>
-      </p:grpSpPr>
-      <p:sp>
-        <p:nvSpPr>
-          <p:cNvPr id="2" name="Title 1"/>
-          <p:cNvSpPr>
-            <a:spLocks noGrp="1"/>
-          </p:cNvSpPr>
-          <p:nvPr>
-            <p:ph type="title"/>
-          </p:nvPr>
-        </p:nvSpPr>
-        <p:spPr/>
-        <p:txBody>
-          <a:bodyPr/>
-          <a:lstStyle/>
-          <a:p>
-            <a:r>
               <a:rPr lang="en-US" dirty="0" smtClean="0"/>
               <a:t>Adding Connected Services</a:t>
             </a:r>
@@ -13616,7 +13440,7 @@
             <a:fld id="{727B4C2D-45E2-4621-8491-2995EB46A674}" type="slidenum">
               <a:rPr lang="en-US" smtClean="0"/>
               <a:pPr/>
-              <a:t>21</a:t>
+              <a:t>20</a:t>
             </a:fld>
             <a:endParaRPr lang="en-US" dirty="0"/>
           </a:p>
@@ -13932,7 +13756,7 @@
 </p:sld>
 </file>
 
-<file path=ppt/slides/slide22.xml><?xml version="1.0" encoding="utf-8"?>
+<file path=ppt/slides/slide21.xml><?xml version="1.0" encoding="utf-8"?>
 <p:sld xmlns:a="http://schemas.openxmlformats.org/drawingml/2006/main" xmlns:r="http://schemas.openxmlformats.org/officeDocument/2006/relationships" xmlns:p="http://schemas.openxmlformats.org/presentationml/2006/main">
   <p:cSld>
     <p:spTree>
@@ -13998,7 +13822,7 @@
             <a:fld id="{727B4C2D-45E2-4621-8491-2995EB46A674}" type="slidenum">
               <a:rPr lang="en-US" smtClean="0"/>
               <a:pPr/>
-              <a:t>22</a:t>
+              <a:t>21</a:t>
             </a:fld>
             <a:endParaRPr lang="en-US" dirty="0"/>
           </a:p>
@@ -14303,7 +14127,7 @@
 </p:sld>
 </file>
 
-<file path=ppt/slides/slide23.xml><?xml version="1.0" encoding="utf-8"?>
+<file path=ppt/slides/slide22.xml><?xml version="1.0" encoding="utf-8"?>
 <p:sld xmlns:a="http://schemas.openxmlformats.org/drawingml/2006/main" xmlns:r="http://schemas.openxmlformats.org/officeDocument/2006/relationships" xmlns:p="http://schemas.openxmlformats.org/presentationml/2006/main">
   <p:cSld>
     <p:spTree>
@@ -14431,7 +14255,7 @@
 </p:sld>
 </file>
 
-<file path=ppt/slides/slide24.xml><?xml version="1.0" encoding="utf-8"?>
+<file path=ppt/slides/slide23.xml><?xml version="1.0" encoding="utf-8"?>
 <p:sld xmlns:a="http://schemas.openxmlformats.org/drawingml/2006/main" xmlns:r="http://schemas.openxmlformats.org/officeDocument/2006/relationships" xmlns:p="http://schemas.openxmlformats.org/presentationml/2006/main">
   <p:cSld>
     <p:spTree>
@@ -14610,7 +14434,7 @@
 </p:sld>
 </file>
 
-<file path=ppt/slides/slide25.xml><?xml version="1.0" encoding="utf-8"?>
+<file path=ppt/slides/slide24.xml><?xml version="1.0" encoding="utf-8"?>
 <p:sld xmlns:a="http://schemas.openxmlformats.org/drawingml/2006/main" xmlns:r="http://schemas.openxmlformats.org/officeDocument/2006/relationships" xmlns:p="http://schemas.openxmlformats.org/presentationml/2006/main">
   <p:cSld>
     <p:spTree>
@@ -14739,7 +14563,7 @@
             <a:fld id="{727B4C2D-45E2-4621-8491-2995EB46A674}" type="slidenum">
               <a:rPr lang="en-US" smtClean="0"/>
               <a:pPr/>
-              <a:t>25</a:t>
+              <a:t>24</a:t>
             </a:fld>
             <a:endParaRPr lang="en-US" dirty="0"/>
           </a:p>
@@ -14914,7 +14738,7 @@
 </p:sld>
 </file>
 
-<file path=ppt/slides/slide26.xml><?xml version="1.0" encoding="utf-8"?>
+<file path=ppt/slides/slide25.xml><?xml version="1.0" encoding="utf-8"?>
 <p:sld xmlns:a="http://schemas.openxmlformats.org/drawingml/2006/main" xmlns:r="http://schemas.openxmlformats.org/officeDocument/2006/relationships" xmlns:p="http://schemas.openxmlformats.org/presentationml/2006/main">
   <p:cSld>
     <p:spTree>
@@ -15033,7 +14857,7 @@
             <a:fld id="{727B4C2D-45E2-4621-8491-2995EB46A674}" type="slidenum">
               <a:rPr lang="en-US" smtClean="0"/>
               <a:pPr/>
-              <a:t>26</a:t>
+              <a:t>25</a:t>
             </a:fld>
             <a:endParaRPr lang="en-US" dirty="0"/>
           </a:p>
@@ -15214,7 +15038,7 @@
 </p:sld>
 </file>
 
-<file path=ppt/slides/slide27.xml><?xml version="1.0" encoding="utf-8"?>
+<file path=ppt/slides/slide26.xml><?xml version="1.0" encoding="utf-8"?>
 <p:sld xmlns:a="http://schemas.openxmlformats.org/drawingml/2006/main" xmlns:r="http://schemas.openxmlformats.org/officeDocument/2006/relationships" xmlns:p="http://schemas.openxmlformats.org/presentationml/2006/main">
   <p:cSld>
     <p:spTree>
@@ -15325,7 +15149,7 @@
 </p:sld>
 </file>
 
-<file path=ppt/slides/slide28.xml><?xml version="1.0" encoding="utf-8"?>
+<file path=ppt/slides/slide27.xml><?xml version="1.0" encoding="utf-8"?>
 <p:sld xmlns:a="http://schemas.openxmlformats.org/drawingml/2006/main" xmlns:r="http://schemas.openxmlformats.org/officeDocument/2006/relationships" xmlns:p="http://schemas.openxmlformats.org/presentationml/2006/main">
   <p:cSld>
     <p:spTree>
@@ -15417,7 +15241,7 @@
 </p:sld>
 </file>
 
-<file path=ppt/slides/slide29.xml><?xml version="1.0" encoding="utf-8"?>
+<file path=ppt/slides/slide28.xml><?xml version="1.0" encoding="utf-8"?>
 <p:sld xmlns:a="http://schemas.openxmlformats.org/drawingml/2006/main" xmlns:r="http://schemas.openxmlformats.org/officeDocument/2006/relationships" xmlns:p="http://schemas.openxmlformats.org/presentationml/2006/main">
   <p:cSld>
     <p:spTree>
@@ -15475,7 +15299,7 @@
             <a:fld id="{727B4C2D-45E2-4621-8491-2995EB46A674}" type="slidenum">
               <a:rPr lang="en-US" smtClean="0"/>
               <a:pPr/>
-              <a:t>29</a:t>
+              <a:t>28</a:t>
             </a:fld>
             <a:endParaRPr lang="en-US" dirty="0"/>
           </a:p>
@@ -15715,6 +15539,88 @@
 </p:sld>
 </file>
 
+<file path=ppt/slides/slide29.xml><?xml version="1.0" encoding="utf-8"?>
+<p:sld xmlns:a="http://schemas.openxmlformats.org/drawingml/2006/main" xmlns:r="http://schemas.openxmlformats.org/officeDocument/2006/relationships" xmlns:p="http://schemas.openxmlformats.org/presentationml/2006/main">
+  <p:cSld>
+    <p:spTree>
+      <p:nvGrpSpPr>
+        <p:cNvPr id="1" name=""/>
+        <p:cNvGrpSpPr/>
+        <p:nvPr/>
+      </p:nvGrpSpPr>
+      <p:grpSpPr>
+        <a:xfrm>
+          <a:off x="0" y="0"/>
+          <a:ext cx="0" cy="0"/>
+          <a:chOff x="0" y="0"/>
+          <a:chExt cx="0" cy="0"/>
+        </a:xfrm>
+      </p:grpSpPr>
+      <p:sp>
+        <p:nvSpPr>
+          <p:cNvPr id="2" name="Subtitle 1"/>
+          <p:cNvSpPr>
+            <a:spLocks noGrp="1"/>
+          </p:cNvSpPr>
+          <p:nvPr>
+            <p:ph type="subTitle" idx="1"/>
+          </p:nvPr>
+        </p:nvSpPr>
+        <p:spPr/>
+        <p:txBody>
+          <a:bodyPr/>
+          <a:lstStyle/>
+          <a:p>
+            <a:r>
+              <a:rPr lang="en-US" dirty="0" smtClean="0"/>
+              <a:t>Examining the CordovaOffice365API App Project</a:t>
+            </a:r>
+            <a:endParaRPr lang="en-US" dirty="0"/>
+          </a:p>
+        </p:txBody>
+      </p:sp>
+      <p:sp>
+        <p:nvSpPr>
+          <p:cNvPr id="3" name="Text Placeholder 2"/>
+          <p:cNvSpPr>
+            <a:spLocks noGrp="1"/>
+          </p:cNvSpPr>
+          <p:nvPr>
+            <p:ph type="body" sz="quarter" idx="10"/>
+          </p:nvPr>
+        </p:nvSpPr>
+        <p:spPr/>
+        <p:txBody>
+          <a:bodyPr/>
+          <a:lstStyle/>
+          <a:p>
+            <a:pPr marL="0" indent="0">
+              <a:buNone/>
+            </a:pPr>
+            <a:r>
+              <a:rPr lang="en-US" dirty="0" smtClean="0"/>
+              <a:t>demo</a:t>
+            </a:r>
+            <a:endParaRPr lang="en-US" dirty="0"/>
+          </a:p>
+        </p:txBody>
+      </p:sp>
+    </p:spTree>
+    <p:extLst>
+      <p:ext uri="{BB962C8B-B14F-4D97-AF65-F5344CB8AC3E}">
+        <p14:creationId xmlns:p14="http://schemas.microsoft.com/office/powerpoint/2010/main" val="4028286101"/>
+      </p:ext>
+    </p:extLst>
+  </p:cSld>
+  <p:clrMapOvr>
+    <a:masterClrMapping/>
+  </p:clrMapOvr>
+  <p:transition>
+    <p:fade/>
+  </p:transition>
+</p:sld>
+</file>
+
 <file path=ppt/slides/slide3.xml><?xml version="1.0" encoding="utf-8"?>
 <p:sld xmlns:a="http://schemas.openxmlformats.org/drawingml/2006/main" xmlns:r="http://schemas.openxmlformats.org/officeDocument/2006/relationships" xmlns:p="http://schemas.openxmlformats.org/presentationml/2006/main">
   <p:cSld>
@@ -15838,12 +15744,12 @@
       </p:grpSpPr>
       <p:sp>
         <p:nvSpPr>
-          <p:cNvPr id="2" name="Subtitle 1"/>
+          <p:cNvPr id="2" name="Title 1"/>
           <p:cNvSpPr>
             <a:spLocks noGrp="1"/>
           </p:cNvSpPr>
           <p:nvPr>
-            <p:ph type="subTitle" idx="1"/>
+            <p:ph type="title"/>
           </p:nvPr>
         </p:nvSpPr>
         <p:spPr/>
@@ -15852,47 +15758,21 @@
           <a:lstStyle/>
           <a:p>
             <a:r>
-              <a:rPr lang="en-US" dirty="0" smtClean="0"/>
-              <a:t>Examining the CordovaOffice365API </a:t>
-            </a:r>
-            <a:r>
-              <a:rPr lang="en-US" dirty="0" smtClean="0"/>
-              <a:t>App Project</a:t>
-            </a:r>
-            <a:endParaRPr lang="en-US" dirty="0"/>
-          </a:p>
-        </p:txBody>
-      </p:sp>
-      <p:sp>
-        <p:nvSpPr>
-          <p:cNvPr id="3" name="Text Placeholder 2"/>
-          <p:cNvSpPr>
-            <a:spLocks noGrp="1"/>
-          </p:cNvSpPr>
-          <p:nvPr>
-            <p:ph type="body" sz="quarter" idx="10"/>
-          </p:nvPr>
-        </p:nvSpPr>
-        <p:spPr/>
-        <p:txBody>
-          <a:bodyPr/>
-          <a:lstStyle/>
-          <a:p>
-            <a:pPr marL="0" indent="0">
-              <a:buNone/>
-            </a:pPr>
-            <a:r>
-              <a:rPr lang="en-US" dirty="0" smtClean="0"/>
-              <a:t>demo</a:t>
-            </a:r>
-            <a:endParaRPr lang="en-US" dirty="0"/>
+              <a:rPr lang="en-US" sz="7200" dirty="0"/>
+              <a:t>Cordova Apps and </a:t>
+            </a:r>
+            <a:r>
+              <a:rPr lang="en-US" sz="7200" dirty="0" err="1"/>
+              <a:t>AngularJS</a:t>
+            </a:r>
+            <a:endParaRPr lang="en-US" sz="7200" dirty="0"/>
           </a:p>
         </p:txBody>
       </p:sp>
     </p:spTree>
     <p:extLst>
       <p:ext uri="{BB962C8B-B14F-4D97-AF65-F5344CB8AC3E}">
-        <p14:creationId xmlns:p14="http://schemas.microsoft.com/office/powerpoint/2010/main" val="4028286101"/>
+        <p14:creationId xmlns:p14="http://schemas.microsoft.com/office/powerpoint/2010/main" val="1242886905"/>
       </p:ext>
     </p:extLst>
   </p:cSld>
@@ -15938,66 +15818,6 @@
           <a:lstStyle/>
           <a:p>
             <a:r>
-              <a:rPr lang="en-US" sz="7200" dirty="0"/>
-              <a:t>Cordova Apps and </a:t>
-            </a:r>
-            <a:r>
-              <a:rPr lang="en-US" sz="7200" dirty="0" err="1"/>
-              <a:t>AngularJS</a:t>
-            </a:r>
-            <a:endParaRPr lang="en-US" sz="7200" dirty="0"/>
-          </a:p>
-        </p:txBody>
-      </p:sp>
-    </p:spTree>
-    <p:extLst>
-      <p:ext uri="{BB962C8B-B14F-4D97-AF65-F5344CB8AC3E}">
-        <p14:creationId xmlns:p14="http://schemas.microsoft.com/office/powerpoint/2010/main" val="1242886905"/>
-      </p:ext>
-    </p:extLst>
-  </p:cSld>
-  <p:clrMapOvr>
-    <a:masterClrMapping/>
-  </p:clrMapOvr>
-  <p:transition>
-    <p:fade/>
-  </p:transition>
-</p:sld>
-</file>
-
-<file path=ppt/slides/slide32.xml><?xml version="1.0" encoding="utf-8"?>
-<p:sld xmlns:a="http://schemas.openxmlformats.org/drawingml/2006/main" xmlns:r="http://schemas.openxmlformats.org/officeDocument/2006/relationships" xmlns:p="http://schemas.openxmlformats.org/presentationml/2006/main">
-  <p:cSld>
-    <p:spTree>
-      <p:nvGrpSpPr>
-        <p:cNvPr id="1" name=""/>
-        <p:cNvGrpSpPr/>
-        <p:nvPr/>
-      </p:nvGrpSpPr>
-      <p:grpSpPr>
-        <a:xfrm>
-          <a:off x="0" y="0"/>
-          <a:ext cx="0" cy="0"/>
-          <a:chOff x="0" y="0"/>
-          <a:chExt cx="0" cy="0"/>
-        </a:xfrm>
-      </p:grpSpPr>
-      <p:sp>
-        <p:nvSpPr>
-          <p:cNvPr id="2" name="Title 1"/>
-          <p:cNvSpPr>
-            <a:spLocks noGrp="1"/>
-          </p:cNvSpPr>
-          <p:nvPr>
-            <p:ph type="title"/>
-          </p:nvPr>
-        </p:nvSpPr>
-        <p:spPr/>
-        <p:txBody>
-          <a:bodyPr/>
-          <a:lstStyle/>
-          <a:p>
-            <a:r>
               <a:rPr lang="en-US" dirty="0" smtClean="0"/>
               <a:t>Structure of an Cordova/Angular App</a:t>
             </a:r>
@@ -16023,7 +15843,7 @@
             <a:fld id="{727B4C2D-45E2-4621-8491-2995EB46A674}" type="slidenum">
               <a:rPr lang="en-US" smtClean="0"/>
               <a:pPr/>
-              <a:t>32</a:t>
+              <a:t>31</a:t>
             </a:fld>
             <a:endParaRPr lang="en-US" dirty="0"/>
           </a:p>
@@ -16069,7 +15889,7 @@
 </p:sld>
 </file>
 
-<file path=ppt/slides/slide33.xml><?xml version="1.0" encoding="utf-8"?>
+<file path=ppt/slides/slide32.xml><?xml version="1.0" encoding="utf-8"?>
 <p:sld xmlns:a="http://schemas.openxmlformats.org/drawingml/2006/main" xmlns:r="http://schemas.openxmlformats.org/officeDocument/2006/relationships" xmlns:p="http://schemas.openxmlformats.org/presentationml/2006/main">
   <p:cSld>
     <p:spTree>
@@ -16166,7 +15986,7 @@
 </p:sld>
 </file>
 
-<file path=ppt/slides/slide34.xml><?xml version="1.0" encoding="utf-8"?>
+<file path=ppt/slides/slide33.xml><?xml version="1.0" encoding="utf-8"?>
 <p:sld xmlns:a="http://schemas.openxmlformats.org/drawingml/2006/main" xmlns:r="http://schemas.openxmlformats.org/officeDocument/2006/relationships" xmlns:p="http://schemas.openxmlformats.org/presentationml/2006/main">
   <p:cSld>
     <p:spTree>
@@ -16320,7 +16140,7 @@
 </p:sld>
 </file>
 
-<file path=ppt/slides/slide35.xml><?xml version="1.0" encoding="utf-8"?>
+<file path=ppt/slides/slide34.xml><?xml version="1.0" encoding="utf-8"?>
 <p:sld xmlns:a="http://schemas.openxmlformats.org/drawingml/2006/main" xmlns:r="http://schemas.openxmlformats.org/officeDocument/2006/relationships" xmlns:p="http://schemas.openxmlformats.org/presentationml/2006/main">
   <p:cSld>
     <p:spTree>
@@ -16756,11 +16576,7 @@
           <a:p>
             <a:r>
               <a:rPr lang="en-US" dirty="0" smtClean="0"/>
-              <a:t>Cordova Apps and Office </a:t>
-            </a:r>
-            <a:r>
-              <a:rPr lang="en-US" dirty="0" smtClean="0"/>
-              <a:t>365</a:t>
+              <a:t>Cordova Apps and Office 365</a:t>
             </a:r>
           </a:p>
           <a:p>
@@ -17311,7 +17127,7 @@
           <a:p>
             <a:r>
               <a:rPr lang="en-US" dirty="0" smtClean="0"/>
-              <a:t>Supported Platforms</a:t>
+              <a:t>Cordova in Visual Studio</a:t>
             </a:r>
             <a:endParaRPr lang="en-US" dirty="0"/>
           </a:p>
@@ -17333,60 +17149,128 @@
           <a:lstStyle/>
           <a:p>
             <a:r>
-              <a:rPr lang="en-GB" dirty="0"/>
-              <a:t>You can use the extension to build apps for the following devices and platforms:</a:t>
+              <a:rPr lang="en-US" dirty="0" smtClean="0"/>
+              <a:t>MS </a:t>
+            </a:r>
+            <a:r>
+              <a:rPr lang="en-US" dirty="0"/>
+              <a:t>Open Tech </a:t>
+            </a:r>
+            <a:r>
+              <a:rPr lang="en-US" dirty="0" smtClean="0"/>
+              <a:t>maintains </a:t>
+            </a:r>
+            <a:r>
+              <a:rPr lang="en-US" dirty="0"/>
+              <a:t>Windows devices support</a:t>
             </a:r>
           </a:p>
           <a:p>
             <a:pPr lvl="1"/>
             <a:r>
-              <a:rPr lang="en-GB" dirty="0" smtClean="0"/>
-              <a:t>Android </a:t>
-            </a:r>
-            <a:r>
-              <a:rPr lang="en-GB" dirty="0"/>
-              <a:t>4 and later (4.4 provides the best developer experience)</a:t>
-            </a:r>
+              <a:rPr lang="en-US" dirty="0" smtClean="0">
+                <a:hlinkClick r:id="rId2"/>
+              </a:rPr>
+              <a:t>http</a:t>
+            </a:r>
+            <a:r>
+              <a:rPr lang="en-US" dirty="0">
+                <a:hlinkClick r:id="rId2"/>
+              </a:rPr>
+              <a:t>://</a:t>
+            </a:r>
+            <a:r>
+              <a:rPr lang="en-US" dirty="0" smtClean="0">
+                <a:hlinkClick r:id="rId2"/>
+              </a:rPr>
+              <a:t>msopentech.com/apache-cordova</a:t>
+            </a:r>
+            <a:r>
+              <a:rPr lang="en-US" dirty="0" smtClean="0"/>
+              <a:t> </a:t>
+            </a:r>
+            <a:endParaRPr lang="en-US" dirty="0"/>
           </a:p>
           <a:p>
             <a:pPr lvl="1"/>
             <a:r>
-              <a:rPr lang="en-GB" dirty="0" smtClean="0"/>
-              <a:t>iOS </a:t>
-            </a:r>
-            <a:r>
-              <a:rPr lang="en-GB" dirty="0"/>
-              <a:t>6 and iOS 7</a:t>
+              <a:rPr lang="en-US" dirty="0" smtClean="0"/>
+              <a:t>Provides developer environment support for CLI and Visual Studio</a:t>
+            </a:r>
+            <a:endParaRPr lang="en-US" dirty="0"/>
+          </a:p>
+          <a:p>
+            <a:r>
+              <a:rPr lang="en-US" dirty="0" smtClean="0"/>
+              <a:t>Command </a:t>
+            </a:r>
+            <a:r>
+              <a:rPr lang="en-US" dirty="0"/>
+              <a:t>Line tools (CLI)</a:t>
             </a:r>
           </a:p>
           <a:p>
             <a:pPr lvl="1"/>
             <a:r>
-              <a:rPr lang="en-GB" dirty="0" smtClean="0"/>
-              <a:t>Windows </a:t>
-            </a:r>
-            <a:r>
-              <a:rPr lang="en-GB" dirty="0"/>
-              <a:t>8 (Windows Store)</a:t>
+              <a:rPr lang="en-US" dirty="0" smtClean="0"/>
+              <a:t>most </a:t>
+            </a:r>
+            <a:r>
+              <a:rPr lang="en-US" dirty="0"/>
+              <a:t>popular amongst Web developers</a:t>
             </a:r>
           </a:p>
           <a:p>
             <a:pPr lvl="1"/>
             <a:r>
-              <a:rPr lang="en-GB" dirty="0" smtClean="0"/>
-              <a:t>Windows </a:t>
-            </a:r>
-            <a:r>
-              <a:rPr lang="en-GB" dirty="0"/>
-              <a:t>Phone 8</a:t>
+              <a:rPr lang="en-US" dirty="0" smtClean="0"/>
+              <a:t>can </a:t>
+            </a:r>
+            <a:r>
+              <a:rPr lang="en-US" dirty="0"/>
+              <a:t>use </a:t>
+            </a:r>
+            <a:r>
+              <a:rPr lang="en-US" dirty="0" err="1"/>
+              <a:t>PhoneGap</a:t>
+            </a:r>
+            <a:r>
+              <a:rPr lang="en-US" dirty="0"/>
+              <a:t> Build service to build across platforms</a:t>
+            </a:r>
+          </a:p>
+          <a:p>
+            <a:r>
+              <a:rPr lang="en-US" dirty="0" smtClean="0"/>
+              <a:t>Visual </a:t>
+            </a:r>
+            <a:r>
+              <a:rPr lang="en-US" dirty="0"/>
+              <a:t>Studio integration (MDD)</a:t>
             </a:r>
           </a:p>
           <a:p>
             <a:pPr lvl="1"/>
-            <a:endParaRPr lang="en-GB" dirty="0"/>
+            <a:r>
+              <a:rPr lang="en-US" dirty="0" smtClean="0"/>
+              <a:t>Full integration with Visual Studio including emulators, cross-debugging, etc.</a:t>
+            </a:r>
           </a:p>
           <a:p>
             <a:pPr lvl="1"/>
+            <a:r>
+              <a:rPr lang="en-US" dirty="0" smtClean="0"/>
+              <a:t>Builds </a:t>
+            </a:r>
+            <a:r>
+              <a:rPr lang="en-US" dirty="0"/>
+              <a:t>for iOS, Android, Windows Phone and Windows Store</a:t>
+            </a:r>
+          </a:p>
+          <a:p>
+            <a:pPr marL="0" indent="0">
+              <a:buNone/>
+            </a:pPr>
             <a:endParaRPr lang="en-US" dirty="0"/>
           </a:p>
         </p:txBody>
@@ -17418,7 +17302,7 @@
     </p:spTree>
     <p:extLst>
       <p:ext uri="{BB962C8B-B14F-4D97-AF65-F5344CB8AC3E}">
-        <p14:creationId xmlns:p14="http://schemas.microsoft.com/office/powerpoint/2010/main" val="4163391355"/>
+        <p14:creationId xmlns:p14="http://schemas.microsoft.com/office/powerpoint/2010/main" val="1350568577"/>
       </p:ext>
     </p:extLst>
   </p:cSld>
@@ -17465,7 +17349,7 @@
           <a:p>
             <a:r>
               <a:rPr lang="en-US" dirty="0" smtClean="0"/>
-              <a:t>Visual Studio Assistance</a:t>
+              <a:t>Setting Up Your Developer Environment</a:t>
             </a:r>
             <a:endParaRPr lang="en-US" dirty="0"/>
           </a:p>
@@ -17486,173 +17370,58 @@
           <a:bodyPr/>
           <a:lstStyle/>
           <a:p>
-            <a:pPr>
-              <a:lnSpc>
-                <a:spcPct val="100000"/>
-              </a:lnSpc>
-            </a:pPr>
-            <a:r>
-              <a:rPr lang="en-GB" sz="3600" dirty="0" smtClean="0"/>
-              <a:t>Easy installation</a:t>
-            </a:r>
-            <a:endParaRPr lang="en-GB" sz="3600" dirty="0"/>
-          </a:p>
-          <a:p>
-            <a:pPr lvl="1">
-              <a:lnSpc>
-                <a:spcPct val="100000"/>
-              </a:lnSpc>
-            </a:pPr>
-            <a:r>
-              <a:rPr lang="en-GB" sz="2000" dirty="0"/>
+            <a:r>
+              <a:rPr lang="en-US" dirty="0" smtClean="0"/>
+              <a:t>Installation Documentation</a:t>
+            </a:r>
+          </a:p>
+          <a:p>
+            <a:pPr lvl="1"/>
+            <a:r>
+              <a:rPr lang="en-US" dirty="0" smtClean="0">
+                <a:hlinkClick r:id="rId2"/>
+              </a:rPr>
+              <a:t>http://msdn.microsoft.com/en-us/library/dn757054.aspx</a:t>
+            </a:r>
+            <a:endParaRPr lang="en-US" dirty="0" smtClean="0"/>
+          </a:p>
+          <a:p>
+            <a:endParaRPr lang="en-US" dirty="0" smtClean="0"/>
+          </a:p>
+          <a:p>
+            <a:r>
+              <a:rPr lang="en-US" dirty="0" smtClean="0"/>
+              <a:t>Setup Overview</a:t>
+            </a:r>
+          </a:p>
+          <a:p>
+            <a:pPr lvl="1"/>
+            <a:r>
+              <a:rPr lang="en-US" dirty="0" smtClean="0"/>
+              <a:t>Windows 8.1 or Windows Server 2012 R2</a:t>
+            </a:r>
+          </a:p>
+          <a:p>
+            <a:pPr lvl="1"/>
+            <a:r>
+              <a:rPr lang="en-US" dirty="0" smtClean="0"/>
+              <a:t>Visual Studio 2013 with Update 3 with Windows Phone SDK</a:t>
+            </a:r>
+          </a:p>
+          <a:p>
+            <a:pPr lvl="1"/>
+            <a:r>
+              <a:rPr lang="en-US" dirty="0"/>
               <a:t>Multi-Device Hybrid Apps for Visual </a:t>
             </a:r>
             <a:r>
-              <a:rPr lang="en-GB" sz="2000" dirty="0" smtClean="0"/>
+              <a:rPr lang="en-US" dirty="0" smtClean="0"/>
               <a:t>Studio CTP 2.0</a:t>
             </a:r>
           </a:p>
           <a:p>
-            <a:pPr>
-              <a:lnSpc>
-                <a:spcPct val="100000"/>
-              </a:lnSpc>
-            </a:pPr>
-            <a:r>
-              <a:rPr lang="en-GB" sz="3600" dirty="0" smtClean="0"/>
-              <a:t>Plugin </a:t>
-            </a:r>
-            <a:r>
-              <a:rPr lang="en-GB" sz="3600" dirty="0"/>
-              <a:t>management. </a:t>
-            </a:r>
-            <a:endParaRPr lang="en-GB" sz="3600" dirty="0" smtClean="0"/>
-          </a:p>
-          <a:p>
-            <a:pPr lvl="1">
-              <a:lnSpc>
-                <a:spcPct val="100000"/>
-              </a:lnSpc>
-            </a:pPr>
-            <a:r>
-              <a:rPr lang="en-GB" sz="2000" dirty="0" smtClean="0"/>
-              <a:t>Visual </a:t>
-            </a:r>
-            <a:r>
-              <a:rPr lang="en-GB" sz="2000" dirty="0"/>
-              <a:t>Studio </a:t>
-            </a:r>
-            <a:r>
-              <a:rPr lang="en-GB" sz="2000" dirty="0" smtClean="0"/>
-              <a:t>assists adding core </a:t>
-            </a:r>
-            <a:r>
-              <a:rPr lang="en-GB" sz="2000" dirty="0"/>
-              <a:t>Cordova </a:t>
-            </a:r>
-            <a:r>
-              <a:rPr lang="en-GB" sz="2000" dirty="0" smtClean="0"/>
-              <a:t>plugins and </a:t>
-            </a:r>
-            <a:r>
-              <a:rPr lang="en-GB" sz="2000" dirty="0"/>
-              <a:t>custom </a:t>
-            </a:r>
-            <a:r>
-              <a:rPr lang="en-GB" sz="2000" dirty="0" smtClean="0"/>
-              <a:t>plugins</a:t>
-            </a:r>
-          </a:p>
-          <a:p>
-            <a:pPr>
-              <a:lnSpc>
-                <a:spcPct val="100000"/>
-              </a:lnSpc>
-            </a:pPr>
-            <a:r>
-              <a:rPr lang="en-GB" sz="3600" dirty="0" smtClean="0"/>
-              <a:t>Unified </a:t>
-            </a:r>
-            <a:r>
-              <a:rPr lang="en-GB" sz="3600" dirty="0"/>
-              <a:t>debugging experience. </a:t>
-            </a:r>
-            <a:endParaRPr lang="en-GB" sz="3600" dirty="0" smtClean="0"/>
-          </a:p>
-          <a:p>
-            <a:pPr lvl="1">
-              <a:lnSpc>
-                <a:spcPct val="100000"/>
-              </a:lnSpc>
-            </a:pPr>
-            <a:r>
-              <a:rPr lang="en-GB" sz="2000" dirty="0" smtClean="0"/>
-              <a:t>Visual Studio debuggers targets many different types of devices</a:t>
-            </a:r>
-          </a:p>
-          <a:p>
-            <a:pPr lvl="1">
-              <a:lnSpc>
-                <a:spcPct val="100000"/>
-              </a:lnSpc>
-            </a:pPr>
-            <a:r>
-              <a:rPr lang="en-GB" sz="2000" dirty="0" smtClean="0"/>
-              <a:t>Deployment targets include </a:t>
-            </a:r>
-            <a:r>
-              <a:rPr lang="en-GB" sz="2000" dirty="0"/>
-              <a:t>the Android emulator, attached Android devices, Apache Ripple, Windows Phone and (coming soon) iOS devices and </a:t>
-            </a:r>
-            <a:r>
-              <a:rPr lang="en-GB" sz="2000" dirty="0" smtClean="0"/>
-              <a:t>emulators</a:t>
-            </a:r>
-            <a:endParaRPr lang="en-GB" sz="2000" dirty="0"/>
-          </a:p>
-          <a:p>
-            <a:pPr>
-              <a:lnSpc>
-                <a:spcPct val="100000"/>
-              </a:lnSpc>
-            </a:pPr>
-            <a:r>
-              <a:rPr lang="en-GB" sz="3600" dirty="0" smtClean="0"/>
-              <a:t>Write </a:t>
-            </a:r>
-            <a:r>
-              <a:rPr lang="en-GB" sz="3600" dirty="0"/>
-              <a:t>once, deploy everywhere. </a:t>
-            </a:r>
-            <a:endParaRPr lang="en-GB" sz="3600" dirty="0" smtClean="0"/>
-          </a:p>
-          <a:p>
-            <a:pPr lvl="1">
-              <a:lnSpc>
-                <a:spcPct val="100000"/>
-              </a:lnSpc>
-            </a:pPr>
-            <a:r>
-              <a:rPr lang="en-GB" sz="2000" dirty="0" smtClean="0"/>
-              <a:t>The </a:t>
-            </a:r>
-            <a:r>
-              <a:rPr lang="en-GB" sz="2000" dirty="0"/>
-              <a:t>common JavaScript and plugin APIs in Cordova make it </a:t>
-            </a:r>
-            <a:r>
-              <a:rPr lang="en-GB" sz="2000" dirty="0" smtClean="0"/>
-              <a:t>possible to </a:t>
-            </a:r>
-            <a:r>
-              <a:rPr lang="en-GB" sz="2000" dirty="0"/>
-              <a:t>write an app using a single code base that deploys to all target </a:t>
-            </a:r>
-            <a:r>
-              <a:rPr lang="en-GB" sz="2000" dirty="0" smtClean="0"/>
-              <a:t>platforms</a:t>
-            </a:r>
-            <a:endParaRPr lang="en-US" sz="2000" dirty="0"/>
+            <a:pPr lvl="1"/>
+            <a:endParaRPr lang="en-US" dirty="0"/>
           </a:p>
         </p:txBody>
       </p:sp>
@@ -17680,10 +17449,34 @@
           </a:p>
         </p:txBody>
       </p:sp>
+      <p:pic>
+        <p:nvPicPr>
+          <p:cNvPr id="5" name="Picture 4"/>
+          <p:cNvPicPr>
+            <a:picLocks noChangeAspect="1"/>
+          </p:cNvPicPr>
+          <p:nvPr/>
+        </p:nvPicPr>
+        <p:blipFill>
+          <a:blip r:embed="rId3"/>
+          <a:stretch>
+            <a:fillRect/>
+          </a:stretch>
+        </p:blipFill>
+        <p:spPr>
+          <a:xfrm>
+            <a:off x="9262497" y="1447799"/>
+            <a:ext cx="2483530" cy="3184635"/>
+          </a:xfrm>
+          <a:prstGeom prst="rect">
+            <a:avLst/>
+          </a:prstGeom>
+        </p:spPr>
+      </p:pic>
     </p:spTree>
     <p:extLst>
       <p:ext uri="{BB962C8B-B14F-4D97-AF65-F5344CB8AC3E}">
-        <p14:creationId xmlns:p14="http://schemas.microsoft.com/office/powerpoint/2010/main" val="3284196491"/>
+        <p14:creationId xmlns:p14="http://schemas.microsoft.com/office/powerpoint/2010/main" val="1181949905"/>
       </p:ext>
     </p:extLst>
   </p:cSld>
@@ -18989,18 +18782,18 @@
 </file>
 
 <file path=customXml/item2.xml><?xml version="1.0" encoding="utf-8"?>
-<p:properties xmlns:p="http://schemas.microsoft.com/office/2006/metadata/properties" xmlns:xsi="http://www.w3.org/2001/XMLSchema-instance" xmlns:pc="http://schemas.microsoft.com/office/infopath/2007/PartnerControls">
-  <documentManagement/>
-</p:properties>
-</file>
-
-<file path=customXml/item3.xml><?xml version="1.0" encoding="utf-8"?>
 <?mso-contentType ?>
 <FormTemplates xmlns="http://schemas.microsoft.com/sharepoint/v3/contenttype/forms">
   <Display>DocumentLibraryForm</Display>
   <Edit>DocumentLibraryForm</Edit>
   <New>DocumentLibraryForm</New>
 </FormTemplates>
+</file>
+
+<file path=customXml/item3.xml><?xml version="1.0" encoding="utf-8"?>
+<p:properties xmlns:p="http://schemas.microsoft.com/office/2006/metadata/properties" xmlns:xsi="http://www.w3.org/2001/XMLSchema-instance" xmlns:pc="http://schemas.microsoft.com/office/infopath/2007/PartnerControls">
+  <documentManagement/>
+</p:properties>
 </file>
 
 <file path=customXml/itemProps1.xml><?xml version="1.0" encoding="utf-8"?>
@@ -19022,6 +18815,14 @@
 </file>
 
 <file path=customXml/itemProps2.xml><?xml version="1.0" encoding="utf-8"?>
+<ds:datastoreItem xmlns:ds="http://schemas.openxmlformats.org/officeDocument/2006/customXml" ds:itemID="{E1E0CE18-CA03-4891-9CD8-3448778E3D53}">
+  <ds:schemaRefs>
+    <ds:schemaRef ds:uri="http://schemas.microsoft.com/sharepoint/v3/contenttype/forms"/>
+  </ds:schemaRefs>
+</ds:datastoreItem>
+</file>
+
+<file path=customXml/itemProps3.xml><?xml version="1.0" encoding="utf-8"?>
 <ds:datastoreItem xmlns:ds="http://schemas.openxmlformats.org/officeDocument/2006/customXml" ds:itemID="{DA593625-DB14-4FB0-B5A9-3269FA9C120B}">
   <ds:schemaRefs>
     <ds:schemaRef ds:uri="http://purl.org/dc/dcmitype/"/>
@@ -19035,12 +18836,4 @@
     <ds:schemaRef ds:uri="http://schemas.openxmlformats.org/package/2006/metadata/core-properties"/>
   </ds:schemaRefs>
 </ds:datastoreItem>
-</file>
-
-<file path=customXml/itemProps3.xml><?xml version="1.0" encoding="utf-8"?>
-<ds:datastoreItem xmlns:ds="http://schemas.openxmlformats.org/officeDocument/2006/customXml" ds:itemID="{E1E0CE18-CA03-4891-9CD8-3448778E3D53}">
-  <ds:schemaRefs>
-    <ds:schemaRef ds:uri="http://schemas.microsoft.com/sharepoint/v3/contenttype/forms"/>
-  </ds:schemaRefs>
-</ds:datastoreItem>
 </file>
</xml_diff>